<commit_message>
updated XANES LCF figures
</commit_message>
<xml_diff>
--- a/figures/Path_Analysis.pptx
+++ b/figures/Path_Analysis.pptx
@@ -5,8 +5,7 @@
     <p:sldMasterId id="2147483648" r:id="rId1"/>
   </p:sldMasterIdLst>
   <p:sldIdLst>
-    <p:sldId id="2373" r:id="rId2"/>
-    <p:sldId id="2374" r:id="rId3"/>
+    <p:sldId id="2374" r:id="rId2"/>
   </p:sldIdLst>
   <p:sldSz cx="12192000" cy="6858000"/>
   <p:notesSz cx="6858000" cy="9144000"/>
@@ -260,7 +259,7 @@
           <a:p>
             <a:fld id="{E1A787AF-D2B6-A74C-82FC-2EE9987086C9}" type="datetimeFigureOut">
               <a:rPr lang="en-US" smtClean="0"/>
-              <a:t>5/1/24</a:t>
+              <a:t>7/8/24</a:t>
             </a:fld>
             <a:endParaRPr lang="en-US"/>
           </a:p>
@@ -458,7 +457,7 @@
           <a:p>
             <a:fld id="{E1A787AF-D2B6-A74C-82FC-2EE9987086C9}" type="datetimeFigureOut">
               <a:rPr lang="en-US" smtClean="0"/>
-              <a:t>5/1/24</a:t>
+              <a:t>7/8/24</a:t>
             </a:fld>
             <a:endParaRPr lang="en-US"/>
           </a:p>
@@ -666,7 +665,7 @@
           <a:p>
             <a:fld id="{E1A787AF-D2B6-A74C-82FC-2EE9987086C9}" type="datetimeFigureOut">
               <a:rPr lang="en-US" smtClean="0"/>
-              <a:t>5/1/24</a:t>
+              <a:t>7/8/24</a:t>
             </a:fld>
             <a:endParaRPr lang="en-US"/>
           </a:p>
@@ -1886,7 +1885,7 @@
           <a:p>
             <a:fld id="{E1A787AF-D2B6-A74C-82FC-2EE9987086C9}" type="datetimeFigureOut">
               <a:rPr lang="en-US" smtClean="0"/>
-              <a:t>5/1/24</a:t>
+              <a:t>7/8/24</a:t>
             </a:fld>
             <a:endParaRPr lang="en-US"/>
           </a:p>
@@ -2161,7 +2160,7 @@
           <a:p>
             <a:fld id="{E1A787AF-D2B6-A74C-82FC-2EE9987086C9}" type="datetimeFigureOut">
               <a:rPr lang="en-US" smtClean="0"/>
-              <a:t>5/1/24</a:t>
+              <a:t>7/8/24</a:t>
             </a:fld>
             <a:endParaRPr lang="en-US"/>
           </a:p>
@@ -2426,7 +2425,7 @@
           <a:p>
             <a:fld id="{E1A787AF-D2B6-A74C-82FC-2EE9987086C9}" type="datetimeFigureOut">
               <a:rPr lang="en-US" smtClean="0"/>
-              <a:t>5/1/24</a:t>
+              <a:t>7/8/24</a:t>
             </a:fld>
             <a:endParaRPr lang="en-US"/>
           </a:p>
@@ -2838,7 +2837,7 @@
           <a:p>
             <a:fld id="{E1A787AF-D2B6-A74C-82FC-2EE9987086C9}" type="datetimeFigureOut">
               <a:rPr lang="en-US" smtClean="0"/>
-              <a:t>5/1/24</a:t>
+              <a:t>7/8/24</a:t>
             </a:fld>
             <a:endParaRPr lang="en-US"/>
           </a:p>
@@ -2979,7 +2978,7 @@
           <a:p>
             <a:fld id="{E1A787AF-D2B6-A74C-82FC-2EE9987086C9}" type="datetimeFigureOut">
               <a:rPr lang="en-US" smtClean="0"/>
-              <a:t>5/1/24</a:t>
+              <a:t>7/8/24</a:t>
             </a:fld>
             <a:endParaRPr lang="en-US"/>
           </a:p>
@@ -3092,7 +3091,7 @@
           <a:p>
             <a:fld id="{E1A787AF-D2B6-A74C-82FC-2EE9987086C9}" type="datetimeFigureOut">
               <a:rPr lang="en-US" smtClean="0"/>
-              <a:t>5/1/24</a:t>
+              <a:t>7/8/24</a:t>
             </a:fld>
             <a:endParaRPr lang="en-US"/>
           </a:p>
@@ -3403,7 +3402,7 @@
           <a:p>
             <a:fld id="{E1A787AF-D2B6-A74C-82FC-2EE9987086C9}" type="datetimeFigureOut">
               <a:rPr lang="en-US" smtClean="0"/>
-              <a:t>5/1/24</a:t>
+              <a:t>7/8/24</a:t>
             </a:fld>
             <a:endParaRPr lang="en-US"/>
           </a:p>
@@ -3691,7 +3690,7 @@
           <a:p>
             <a:fld id="{E1A787AF-D2B6-A74C-82FC-2EE9987086C9}" type="datetimeFigureOut">
               <a:rPr lang="en-US" smtClean="0"/>
-              <a:t>5/1/24</a:t>
+              <a:t>7/8/24</a:t>
             </a:fld>
             <a:endParaRPr lang="en-US"/>
           </a:p>
@@ -3932,7 +3931,7 @@
           <a:p>
             <a:fld id="{E1A787AF-D2B6-A74C-82FC-2EE9987086C9}" type="datetimeFigureOut">
               <a:rPr lang="en-US" smtClean="0"/>
-              <a:t>5/1/24</a:t>
+              <a:t>7/8/24</a:t>
             </a:fld>
             <a:endParaRPr lang="en-US"/>
           </a:p>
@@ -4334,621 +4333,6 @@
 </file>
 
 <file path=ppt/slides/slide1.xml><?xml version="1.0" encoding="utf-8"?>
-<p:sld xmlns:a="http://schemas.openxmlformats.org/drawingml/2006/main" xmlns:r="http://schemas.openxmlformats.org/officeDocument/2006/relationships" xmlns:p="http://schemas.openxmlformats.org/presentationml/2006/main">
-  <p:cSld>
-    <p:spTree>
-      <p:nvGrpSpPr>
-        <p:cNvPr id="1" name=""/>
-        <p:cNvGrpSpPr/>
-        <p:nvPr/>
-      </p:nvGrpSpPr>
-      <p:grpSpPr>
-        <a:xfrm>
-          <a:off x="0" y="0"/>
-          <a:ext cx="0" cy="0"/>
-          <a:chOff x="0" y="0"/>
-          <a:chExt cx="0" cy="0"/>
-        </a:xfrm>
-      </p:grpSpPr>
-      <p:sp>
-        <p:nvSpPr>
-          <p:cNvPr id="4" name="TextBox 3">
-            <a:extLst>
-              <a:ext uri="{FF2B5EF4-FFF2-40B4-BE49-F238E27FC236}">
-                <a16:creationId xmlns:a16="http://schemas.microsoft.com/office/drawing/2014/main" id="{96828F2E-0933-6E5F-9C72-CD5D5A055D4A}"/>
-              </a:ext>
-            </a:extLst>
-          </p:cNvPr>
-          <p:cNvSpPr txBox="1"/>
-          <p:nvPr/>
-        </p:nvSpPr>
-        <p:spPr>
-          <a:xfrm>
-            <a:off x="716437" y="263951"/>
-            <a:ext cx="2685863" cy="369332"/>
-          </a:xfrm>
-          <a:prstGeom prst="rect">
-            <a:avLst/>
-          </a:prstGeom>
-          <a:noFill/>
-        </p:spPr>
-        <p:txBody>
-          <a:bodyPr wrap="none" rtlCol="0">
-            <a:spAutoFit/>
-          </a:bodyPr>
-          <a:lstStyle/>
-          <a:p>
-            <a:r>
-              <a:rPr lang="en-US" dirty="0"/>
-              <a:t>Conceptual model for SEM</a:t>
-            </a:r>
-          </a:p>
-        </p:txBody>
-      </p:sp>
-      <p:sp>
-        <p:nvSpPr>
-          <p:cNvPr id="6" name="TextBox 5">
-            <a:extLst>
-              <a:ext uri="{FF2B5EF4-FFF2-40B4-BE49-F238E27FC236}">
-                <a16:creationId xmlns:a16="http://schemas.microsoft.com/office/drawing/2014/main" id="{B53ED126-DC22-F0AA-FD83-90C01FB8BFAB}"/>
-              </a:ext>
-            </a:extLst>
-          </p:cNvPr>
-          <p:cNvSpPr txBox="1"/>
-          <p:nvPr/>
-        </p:nvSpPr>
-        <p:spPr>
-          <a:xfrm>
-            <a:off x="5921604" y="1423448"/>
-            <a:ext cx="1682496" cy="369332"/>
-          </a:xfrm>
-          <a:prstGeom prst="rect">
-            <a:avLst/>
-          </a:prstGeom>
-          <a:noFill/>
-          <a:ln w="28575">
-            <a:solidFill>
-              <a:schemeClr val="tx1"/>
-            </a:solidFill>
-          </a:ln>
-        </p:spPr>
-        <p:txBody>
-          <a:bodyPr wrap="square" rtlCol="0">
-            <a:spAutoFit/>
-          </a:bodyPr>
-          <a:lstStyle/>
-          <a:p>
-            <a:pPr algn="ctr"/>
-            <a:r>
-              <a:rPr lang="en-US" dirty="0"/>
-              <a:t>Burn Severity</a:t>
-            </a:r>
-          </a:p>
-        </p:txBody>
-      </p:sp>
-      <p:sp>
-        <p:nvSpPr>
-          <p:cNvPr id="7" name="TextBox 6">
-            <a:extLst>
-              <a:ext uri="{FF2B5EF4-FFF2-40B4-BE49-F238E27FC236}">
-                <a16:creationId xmlns:a16="http://schemas.microsoft.com/office/drawing/2014/main" id="{597D8B4A-40FC-2609-2BB4-D85828817229}"/>
-              </a:ext>
-            </a:extLst>
-          </p:cNvPr>
-          <p:cNvSpPr txBox="1"/>
-          <p:nvPr/>
-        </p:nvSpPr>
-        <p:spPr>
-          <a:xfrm>
-            <a:off x="8928754" y="1423448"/>
-            <a:ext cx="1685828" cy="369332"/>
-          </a:xfrm>
-          <a:prstGeom prst="rect">
-            <a:avLst/>
-          </a:prstGeom>
-          <a:noFill/>
-          <a:ln w="28575">
-            <a:solidFill>
-              <a:schemeClr val="tx1"/>
-            </a:solidFill>
-          </a:ln>
-        </p:spPr>
-        <p:txBody>
-          <a:bodyPr wrap="square" rtlCol="0">
-            <a:spAutoFit/>
-          </a:bodyPr>
-          <a:lstStyle/>
-          <a:p>
-            <a:pPr algn="ctr"/>
-            <a:r>
-              <a:rPr lang="en-US" dirty="0"/>
-              <a:t>Landcover</a:t>
-            </a:r>
-          </a:p>
-        </p:txBody>
-      </p:sp>
-      <p:sp>
-        <p:nvSpPr>
-          <p:cNvPr id="8" name="TextBox 7">
-            <a:extLst>
-              <a:ext uri="{FF2B5EF4-FFF2-40B4-BE49-F238E27FC236}">
-                <a16:creationId xmlns:a16="http://schemas.microsoft.com/office/drawing/2014/main" id="{42631603-E90A-4EC3-054B-3EDE758D6923}"/>
-              </a:ext>
-            </a:extLst>
-          </p:cNvPr>
-          <p:cNvSpPr txBox="1"/>
-          <p:nvPr/>
-        </p:nvSpPr>
-        <p:spPr>
-          <a:xfrm>
-            <a:off x="5921604" y="3089629"/>
-            <a:ext cx="1682496" cy="369332"/>
-          </a:xfrm>
-          <a:prstGeom prst="rect">
-            <a:avLst/>
-          </a:prstGeom>
-          <a:noFill/>
-          <a:ln w="28575">
-            <a:solidFill>
-              <a:schemeClr val="tx1"/>
-            </a:solidFill>
-          </a:ln>
-        </p:spPr>
-        <p:txBody>
-          <a:bodyPr wrap="square" rtlCol="0">
-            <a:spAutoFit/>
-          </a:bodyPr>
-          <a:lstStyle/>
-          <a:p>
-            <a:pPr algn="ctr"/>
-            <a:r>
-              <a:rPr lang="en-US" dirty="0"/>
-              <a:t>Char P (g kg</a:t>
-            </a:r>
-            <a:r>
-              <a:rPr lang="en-US" baseline="30000" dirty="0"/>
-              <a:t>-1</a:t>
-            </a:r>
-            <a:r>
-              <a:rPr lang="en-US" dirty="0"/>
-              <a:t>)</a:t>
-            </a:r>
-          </a:p>
-        </p:txBody>
-      </p:sp>
-      <p:sp>
-        <p:nvSpPr>
-          <p:cNvPr id="9" name="TextBox 8">
-            <a:extLst>
-              <a:ext uri="{FF2B5EF4-FFF2-40B4-BE49-F238E27FC236}">
-                <a16:creationId xmlns:a16="http://schemas.microsoft.com/office/drawing/2014/main" id="{CB5E689A-102B-17F5-143C-FB84DA2EF03A}"/>
-              </a:ext>
-            </a:extLst>
-          </p:cNvPr>
-          <p:cNvSpPr txBox="1"/>
-          <p:nvPr/>
-        </p:nvSpPr>
-        <p:spPr>
-          <a:xfrm>
-            <a:off x="8928754" y="3089629"/>
-            <a:ext cx="1682496" cy="369332"/>
-          </a:xfrm>
-          <a:prstGeom prst="rect">
-            <a:avLst/>
-          </a:prstGeom>
-          <a:noFill/>
-          <a:ln w="28575">
-            <a:solidFill>
-              <a:schemeClr val="tx1"/>
-            </a:solidFill>
-          </a:ln>
-        </p:spPr>
-        <p:txBody>
-          <a:bodyPr wrap="square" rtlCol="0">
-            <a:spAutoFit/>
-          </a:bodyPr>
-          <a:lstStyle/>
-          <a:p>
-            <a:pPr algn="ctr"/>
-            <a:r>
-              <a:rPr lang="en-US" dirty="0"/>
-              <a:t>Ca-Pi (%)</a:t>
-            </a:r>
-          </a:p>
-        </p:txBody>
-      </p:sp>
-      <p:sp>
-        <p:nvSpPr>
-          <p:cNvPr id="10" name="TextBox 9">
-            <a:extLst>
-              <a:ext uri="{FF2B5EF4-FFF2-40B4-BE49-F238E27FC236}">
-                <a16:creationId xmlns:a16="http://schemas.microsoft.com/office/drawing/2014/main" id="{5E6747B1-E5B1-99FB-9759-8A7861598570}"/>
-              </a:ext>
-            </a:extLst>
-          </p:cNvPr>
-          <p:cNvSpPr txBox="1"/>
-          <p:nvPr/>
-        </p:nvSpPr>
-        <p:spPr>
-          <a:xfrm>
-            <a:off x="7432362" y="4554242"/>
-            <a:ext cx="1682496" cy="646331"/>
-          </a:xfrm>
-          <a:prstGeom prst="rect">
-            <a:avLst/>
-          </a:prstGeom>
-          <a:noFill/>
-          <a:ln w="28575">
-            <a:solidFill>
-              <a:schemeClr val="tx1"/>
-            </a:solidFill>
-          </a:ln>
-        </p:spPr>
-        <p:txBody>
-          <a:bodyPr wrap="square" rtlCol="0">
-            <a:spAutoFit/>
-          </a:bodyPr>
-          <a:lstStyle/>
-          <a:p>
-            <a:pPr algn="ctr"/>
-            <a:r>
-              <a:rPr lang="en-US" dirty="0"/>
-              <a:t>Leachable P (mg g</a:t>
-            </a:r>
-            <a:r>
-              <a:rPr lang="en-US" baseline="30000" dirty="0"/>
-              <a:t>-1</a:t>
-            </a:r>
-            <a:r>
-              <a:rPr lang="en-US" dirty="0"/>
-              <a:t>) </a:t>
-            </a:r>
-          </a:p>
-        </p:txBody>
-      </p:sp>
-      <p:cxnSp>
-        <p:nvCxnSpPr>
-          <p:cNvPr id="18" name="Straight Arrow Connector 17">
-            <a:extLst>
-              <a:ext uri="{FF2B5EF4-FFF2-40B4-BE49-F238E27FC236}">
-                <a16:creationId xmlns:a16="http://schemas.microsoft.com/office/drawing/2014/main" id="{3B4AE393-AF1B-330B-82F8-C5E0B2A033C7}"/>
-              </a:ext>
-            </a:extLst>
-          </p:cNvPr>
-          <p:cNvCxnSpPr>
-            <a:cxnSpLocks/>
-            <a:stCxn id="6" idx="2"/>
-          </p:cNvCxnSpPr>
-          <p:nvPr/>
-        </p:nvCxnSpPr>
-        <p:spPr>
-          <a:xfrm>
-            <a:off x="6762852" y="1792780"/>
-            <a:ext cx="6350" cy="1196930"/>
-          </a:xfrm>
-          <a:prstGeom prst="straightConnector1">
-            <a:avLst/>
-          </a:prstGeom>
-          <a:ln w="19050">
-            <a:solidFill>
-              <a:schemeClr val="tx1"/>
-            </a:solidFill>
-            <a:tailEnd type="triangle"/>
-          </a:ln>
-        </p:spPr>
-        <p:style>
-          <a:lnRef idx="1">
-            <a:schemeClr val="accent1"/>
-          </a:lnRef>
-          <a:fillRef idx="0">
-            <a:schemeClr val="accent1"/>
-          </a:fillRef>
-          <a:effectRef idx="0">
-            <a:schemeClr val="accent1"/>
-          </a:effectRef>
-          <a:fontRef idx="minor">
-            <a:schemeClr val="tx1"/>
-          </a:fontRef>
-        </p:style>
-      </p:cxnSp>
-      <p:cxnSp>
-        <p:nvCxnSpPr>
-          <p:cNvPr id="21" name="Straight Arrow Connector 20">
-            <a:extLst>
-              <a:ext uri="{FF2B5EF4-FFF2-40B4-BE49-F238E27FC236}">
-                <a16:creationId xmlns:a16="http://schemas.microsoft.com/office/drawing/2014/main" id="{85AF0FC8-3CBB-575F-3E54-E6637B2A1987}"/>
-              </a:ext>
-            </a:extLst>
-          </p:cNvPr>
-          <p:cNvCxnSpPr>
-            <a:cxnSpLocks/>
-            <a:stCxn id="6" idx="2"/>
-          </p:cNvCxnSpPr>
-          <p:nvPr/>
-        </p:nvCxnSpPr>
-        <p:spPr>
-          <a:xfrm>
-            <a:off x="6762852" y="1792780"/>
-            <a:ext cx="2824114" cy="1263934"/>
-          </a:xfrm>
-          <a:prstGeom prst="straightConnector1">
-            <a:avLst/>
-          </a:prstGeom>
-          <a:ln w="19050">
-            <a:solidFill>
-              <a:schemeClr val="tx1"/>
-            </a:solidFill>
-            <a:tailEnd type="triangle"/>
-          </a:ln>
-        </p:spPr>
-        <p:style>
-          <a:lnRef idx="1">
-            <a:schemeClr val="accent1"/>
-          </a:lnRef>
-          <a:fillRef idx="0">
-            <a:schemeClr val="accent1"/>
-          </a:fillRef>
-          <a:effectRef idx="0">
-            <a:schemeClr val="accent1"/>
-          </a:effectRef>
-          <a:fontRef idx="minor">
-            <a:schemeClr val="tx1"/>
-          </a:fontRef>
-        </p:style>
-      </p:cxnSp>
-      <p:cxnSp>
-        <p:nvCxnSpPr>
-          <p:cNvPr id="23" name="Straight Arrow Connector 22">
-            <a:extLst>
-              <a:ext uri="{FF2B5EF4-FFF2-40B4-BE49-F238E27FC236}">
-                <a16:creationId xmlns:a16="http://schemas.microsoft.com/office/drawing/2014/main" id="{2C3605D5-4BFC-9E1F-11D2-2A270BB37A41}"/>
-              </a:ext>
-            </a:extLst>
-          </p:cNvPr>
-          <p:cNvCxnSpPr>
-            <a:cxnSpLocks/>
-            <a:stCxn id="7" idx="2"/>
-          </p:cNvCxnSpPr>
-          <p:nvPr/>
-        </p:nvCxnSpPr>
-        <p:spPr>
-          <a:xfrm>
-            <a:off x="9771668" y="1792780"/>
-            <a:ext cx="6350" cy="1196930"/>
-          </a:xfrm>
-          <a:prstGeom prst="straightConnector1">
-            <a:avLst/>
-          </a:prstGeom>
-          <a:ln w="19050">
-            <a:solidFill>
-              <a:schemeClr val="tx1"/>
-            </a:solidFill>
-            <a:tailEnd type="triangle"/>
-          </a:ln>
-        </p:spPr>
-        <p:style>
-          <a:lnRef idx="1">
-            <a:schemeClr val="accent1"/>
-          </a:lnRef>
-          <a:fillRef idx="0">
-            <a:schemeClr val="accent1"/>
-          </a:fillRef>
-          <a:effectRef idx="0">
-            <a:schemeClr val="accent1"/>
-          </a:effectRef>
-          <a:fontRef idx="minor">
-            <a:schemeClr val="tx1"/>
-          </a:fontRef>
-        </p:style>
-      </p:cxnSp>
-      <p:cxnSp>
-        <p:nvCxnSpPr>
-          <p:cNvPr id="25" name="Straight Arrow Connector 24">
-            <a:extLst>
-              <a:ext uri="{FF2B5EF4-FFF2-40B4-BE49-F238E27FC236}">
-                <a16:creationId xmlns:a16="http://schemas.microsoft.com/office/drawing/2014/main" id="{C3929FA9-ED18-BC35-8F66-15DF693E0572}"/>
-              </a:ext>
-            </a:extLst>
-          </p:cNvPr>
-          <p:cNvCxnSpPr>
-            <a:cxnSpLocks/>
-            <a:stCxn id="7" idx="2"/>
-          </p:cNvCxnSpPr>
-          <p:nvPr/>
-        </p:nvCxnSpPr>
-        <p:spPr>
-          <a:xfrm flipH="1">
-            <a:off x="6966408" y="1792780"/>
-            <a:ext cx="2805260" cy="1263934"/>
-          </a:xfrm>
-          <a:prstGeom prst="straightConnector1">
-            <a:avLst/>
-          </a:prstGeom>
-          <a:ln w="19050">
-            <a:solidFill>
-              <a:schemeClr val="tx1"/>
-            </a:solidFill>
-            <a:tailEnd type="triangle"/>
-          </a:ln>
-        </p:spPr>
-        <p:style>
-          <a:lnRef idx="1">
-            <a:schemeClr val="accent1"/>
-          </a:lnRef>
-          <a:fillRef idx="0">
-            <a:schemeClr val="accent1"/>
-          </a:fillRef>
-          <a:effectRef idx="0">
-            <a:schemeClr val="accent1"/>
-          </a:effectRef>
-          <a:fontRef idx="minor">
-            <a:schemeClr val="tx1"/>
-          </a:fontRef>
-        </p:style>
-      </p:cxnSp>
-      <p:cxnSp>
-        <p:nvCxnSpPr>
-          <p:cNvPr id="30" name="Straight Arrow Connector 29">
-            <a:extLst>
-              <a:ext uri="{FF2B5EF4-FFF2-40B4-BE49-F238E27FC236}">
-                <a16:creationId xmlns:a16="http://schemas.microsoft.com/office/drawing/2014/main" id="{A3582669-9B17-7F4A-B202-6722B35FE50B}"/>
-              </a:ext>
-            </a:extLst>
-          </p:cNvPr>
-          <p:cNvCxnSpPr>
-            <a:cxnSpLocks/>
-            <a:stCxn id="8" idx="2"/>
-          </p:cNvCxnSpPr>
-          <p:nvPr/>
-        </p:nvCxnSpPr>
-        <p:spPr>
-          <a:xfrm>
-            <a:off x="6762852" y="3458961"/>
-            <a:ext cx="1315919" cy="1028277"/>
-          </a:xfrm>
-          <a:prstGeom prst="straightConnector1">
-            <a:avLst/>
-          </a:prstGeom>
-          <a:ln w="19050">
-            <a:solidFill>
-              <a:schemeClr val="tx1"/>
-            </a:solidFill>
-            <a:tailEnd type="triangle"/>
-          </a:ln>
-        </p:spPr>
-        <p:style>
-          <a:lnRef idx="1">
-            <a:schemeClr val="accent1"/>
-          </a:lnRef>
-          <a:fillRef idx="0">
-            <a:schemeClr val="accent1"/>
-          </a:fillRef>
-          <a:effectRef idx="0">
-            <a:schemeClr val="accent1"/>
-          </a:effectRef>
-          <a:fontRef idx="minor">
-            <a:schemeClr val="tx1"/>
-          </a:fontRef>
-        </p:style>
-      </p:cxnSp>
-      <p:cxnSp>
-        <p:nvCxnSpPr>
-          <p:cNvPr id="32" name="Straight Arrow Connector 31">
-            <a:extLst>
-              <a:ext uri="{FF2B5EF4-FFF2-40B4-BE49-F238E27FC236}">
-                <a16:creationId xmlns:a16="http://schemas.microsoft.com/office/drawing/2014/main" id="{53FE9DC5-28B1-29B5-DB5A-C92F1496FCFD}"/>
-              </a:ext>
-            </a:extLst>
-          </p:cNvPr>
-          <p:cNvCxnSpPr>
-            <a:cxnSpLocks/>
-            <a:stCxn id="9" idx="2"/>
-          </p:cNvCxnSpPr>
-          <p:nvPr/>
-        </p:nvCxnSpPr>
-        <p:spPr>
-          <a:xfrm flipH="1">
-            <a:off x="8521831" y="3458961"/>
-            <a:ext cx="1248171" cy="1028277"/>
-          </a:xfrm>
-          <a:prstGeom prst="straightConnector1">
-            <a:avLst/>
-          </a:prstGeom>
-          <a:ln w="19050">
-            <a:solidFill>
-              <a:schemeClr val="tx1"/>
-            </a:solidFill>
-            <a:tailEnd type="triangle"/>
-          </a:ln>
-        </p:spPr>
-        <p:style>
-          <a:lnRef idx="1">
-            <a:schemeClr val="accent1"/>
-          </a:lnRef>
-          <a:fillRef idx="0">
-            <a:schemeClr val="accent1"/>
-          </a:fillRef>
-          <a:effectRef idx="0">
-            <a:schemeClr val="accent1"/>
-          </a:effectRef>
-          <a:fontRef idx="minor">
-            <a:schemeClr val="tx1"/>
-          </a:fontRef>
-        </p:style>
-      </p:cxnSp>
-      <p:cxnSp>
-        <p:nvCxnSpPr>
-          <p:cNvPr id="3" name="Curved Connector 2">
-            <a:extLst>
-              <a:ext uri="{FF2B5EF4-FFF2-40B4-BE49-F238E27FC236}">
-                <a16:creationId xmlns:a16="http://schemas.microsoft.com/office/drawing/2014/main" id="{946B1408-77CC-DACA-4BFD-481F8653C09D}"/>
-              </a:ext>
-            </a:extLst>
-          </p:cNvPr>
-          <p:cNvCxnSpPr>
-            <a:stCxn id="7" idx="0"/>
-            <a:endCxn id="6" idx="0"/>
-          </p:cNvCxnSpPr>
-          <p:nvPr/>
-        </p:nvCxnSpPr>
-        <p:spPr>
-          <a:xfrm rot="16200000" flipV="1">
-            <a:off x="8267260" y="-80960"/>
-            <a:ext cx="12700" cy="3008816"/>
-          </a:xfrm>
-          <a:prstGeom prst="curvedConnector3">
-            <a:avLst>
-              <a:gd name="adj1" fmla="val 3857142"/>
-            </a:avLst>
-          </a:prstGeom>
-          <a:ln w="19050">
-            <a:solidFill>
-              <a:srgbClr val="000000"/>
-            </a:solidFill>
-            <a:tailEnd type="triangle"/>
-          </a:ln>
-        </p:spPr>
-        <p:style>
-          <a:lnRef idx="1">
-            <a:schemeClr val="accent1"/>
-          </a:lnRef>
-          <a:fillRef idx="0">
-            <a:schemeClr val="accent1"/>
-          </a:fillRef>
-          <a:effectRef idx="0">
-            <a:schemeClr val="accent1"/>
-          </a:effectRef>
-          <a:fontRef idx="minor">
-            <a:schemeClr val="tx1"/>
-          </a:fontRef>
-        </p:style>
-      </p:cxnSp>
-    </p:spTree>
-    <p:extLst>
-      <p:ext uri="{BB962C8B-B14F-4D97-AF65-F5344CB8AC3E}">
-        <p14:creationId xmlns:p14="http://schemas.microsoft.com/office/powerpoint/2010/main" val="422380960"/>
-      </p:ext>
-    </p:extLst>
-  </p:cSld>
-  <p:clrMapOvr>
-    <a:masterClrMapping/>
-  </p:clrMapOvr>
-  <mc:AlternateContent xmlns:mc="http://schemas.openxmlformats.org/markup-compatibility/2006" xmlns:p14="http://schemas.microsoft.com/office/powerpoint/2010/main">
-    <mc:Choice Requires="p14">
-      <p:transition spd="med" p14:dur="700">
-        <p:fade/>
-      </p:transition>
-    </mc:Choice>
-    <mc:Fallback xmlns="">
-      <p:transition spd="med">
-        <p:fade/>
-      </p:transition>
-    </mc:Fallback>
-  </mc:AlternateContent>
-</p:sld>
-</file>
-
-<file path=ppt/slides/slide2.xml><?xml version="1.0" encoding="utf-8"?>
 <p:sld xmlns:a="http://schemas.openxmlformats.org/drawingml/2006/main" xmlns:r="http://schemas.openxmlformats.org/officeDocument/2006/relationships" xmlns:p="http://schemas.openxmlformats.org/presentationml/2006/main">
   <p:cSld>
     <p:spTree>

</xml_diff>